<commit_message>
Presentacion con las Fonts guardadas
</commit_message>
<xml_diff>
--- a/Patrón Proxy.pptx
+++ b/Patrón Proxy.pptx
@@ -1,6 +1,6 @@
 
 <file path=ppt/presentation.xml><?xml version="1.0" encoding="utf-8"?>
-<p:presentation xmlns:a="http://schemas.openxmlformats.org/drawingml/2006/main" xmlns:r="http://schemas.openxmlformats.org/officeDocument/2006/relationships" xmlns:p="http://schemas.openxmlformats.org/presentationml/2006/main" saveSubsetFonts="1">
+<p:presentation xmlns:a="http://schemas.openxmlformats.org/drawingml/2006/main" xmlns:r="http://schemas.openxmlformats.org/officeDocument/2006/relationships" xmlns:p="http://schemas.openxmlformats.org/presentationml/2006/main" embedTrueTypeFonts="1">
   <p:sldMasterIdLst>
     <p:sldMasterId id="2147483648" r:id="rId1"/>
   </p:sldMasterIdLst>
@@ -24,6 +24,32 @@
   </p:sldIdLst>
   <p:sldSz cx="12192000" cy="6858000"/>
   <p:notesSz cx="6858000" cy="9144000"/>
+  <p:embeddedFontLst>
+    <p:embeddedFont>
+      <p:font typeface="Pokemon GB" pitchFamily="2" charset="0"/>
+      <p:regular r:id="rId18"/>
+    </p:embeddedFont>
+    <p:embeddedFont>
+      <p:font typeface="Calibri Light" panose="020F0302020204030204" pitchFamily="34" charset="0"/>
+      <p:regular r:id="rId19"/>
+      <p:italic r:id="rId20"/>
+    </p:embeddedFont>
+    <p:embeddedFont>
+      <p:font typeface="8bitoperator" panose="02010501010101010101" pitchFamily="2" charset="0"/>
+      <p:regular r:id="rId21"/>
+    </p:embeddedFont>
+    <p:embeddedFont>
+      <p:font typeface="Pokemon Solid" panose="040B0500000000000000" pitchFamily="82" charset="2"/>
+      <p:regular r:id="rId22"/>
+    </p:embeddedFont>
+    <p:embeddedFont>
+      <p:font typeface="Calibri" panose="020F0502020204030204" pitchFamily="34" charset="0"/>
+      <p:regular r:id="rId23"/>
+      <p:bold r:id="rId24"/>
+      <p:italic r:id="rId25"/>
+      <p:boldItalic r:id="rId26"/>
+    </p:embeddedFont>
+  </p:embeddedFontLst>
   <p:defaultTextStyle>
     <a:defPPr>
       <a:defRPr lang="es-ES"/>
@@ -258,7 +284,7 @@
           <a:p>
             <a:fld id="{B9297548-97C3-46B5-B6F4-7C507BC4CE00}" type="datetimeFigureOut">
               <a:rPr lang="es-ES" smtClean="0"/>
-              <a:t>27/04/2017</a:t>
+              <a:t>28/04/2017</a:t>
             </a:fld>
             <a:endParaRPr lang="es-ES"/>
           </a:p>
@@ -428,7 +454,7 @@
           <a:p>
             <a:fld id="{B9297548-97C3-46B5-B6F4-7C507BC4CE00}" type="datetimeFigureOut">
               <a:rPr lang="es-ES" smtClean="0"/>
-              <a:t>27/04/2017</a:t>
+              <a:t>28/04/2017</a:t>
             </a:fld>
             <a:endParaRPr lang="es-ES"/>
           </a:p>
@@ -608,7 +634,7 @@
           <a:p>
             <a:fld id="{B9297548-97C3-46B5-B6F4-7C507BC4CE00}" type="datetimeFigureOut">
               <a:rPr lang="es-ES" smtClean="0"/>
-              <a:t>27/04/2017</a:t>
+              <a:t>28/04/2017</a:t>
             </a:fld>
             <a:endParaRPr lang="es-ES"/>
           </a:p>
@@ -778,7 +804,7 @@
           <a:p>
             <a:fld id="{B9297548-97C3-46B5-B6F4-7C507BC4CE00}" type="datetimeFigureOut">
               <a:rPr lang="es-ES" smtClean="0"/>
-              <a:t>27/04/2017</a:t>
+              <a:t>28/04/2017</a:t>
             </a:fld>
             <a:endParaRPr lang="es-ES"/>
           </a:p>
@@ -1024,7 +1050,7 @@
           <a:p>
             <a:fld id="{B9297548-97C3-46B5-B6F4-7C507BC4CE00}" type="datetimeFigureOut">
               <a:rPr lang="es-ES" smtClean="0"/>
-              <a:t>27/04/2017</a:t>
+              <a:t>28/04/2017</a:t>
             </a:fld>
             <a:endParaRPr lang="es-ES"/>
           </a:p>
@@ -1256,7 +1282,7 @@
           <a:p>
             <a:fld id="{B9297548-97C3-46B5-B6F4-7C507BC4CE00}" type="datetimeFigureOut">
               <a:rPr lang="es-ES" smtClean="0"/>
-              <a:t>27/04/2017</a:t>
+              <a:t>28/04/2017</a:t>
             </a:fld>
             <a:endParaRPr lang="es-ES"/>
           </a:p>
@@ -1623,7 +1649,7 @@
           <a:p>
             <a:fld id="{B9297548-97C3-46B5-B6F4-7C507BC4CE00}" type="datetimeFigureOut">
               <a:rPr lang="es-ES" smtClean="0"/>
-              <a:t>27/04/2017</a:t>
+              <a:t>28/04/2017</a:t>
             </a:fld>
             <a:endParaRPr lang="es-ES"/>
           </a:p>
@@ -1741,7 +1767,7 @@
           <a:p>
             <a:fld id="{B9297548-97C3-46B5-B6F4-7C507BC4CE00}" type="datetimeFigureOut">
               <a:rPr lang="es-ES" smtClean="0"/>
-              <a:t>27/04/2017</a:t>
+              <a:t>28/04/2017</a:t>
             </a:fld>
             <a:endParaRPr lang="es-ES"/>
           </a:p>
@@ -1836,7 +1862,7 @@
           <a:p>
             <a:fld id="{B9297548-97C3-46B5-B6F4-7C507BC4CE00}" type="datetimeFigureOut">
               <a:rPr lang="es-ES" smtClean="0"/>
-              <a:t>27/04/2017</a:t>
+              <a:t>28/04/2017</a:t>
             </a:fld>
             <a:endParaRPr lang="es-ES"/>
           </a:p>
@@ -2113,7 +2139,7 @@
           <a:p>
             <a:fld id="{B9297548-97C3-46B5-B6F4-7C507BC4CE00}" type="datetimeFigureOut">
               <a:rPr lang="es-ES" smtClean="0"/>
-              <a:t>27/04/2017</a:t>
+              <a:t>28/04/2017</a:t>
             </a:fld>
             <a:endParaRPr lang="es-ES"/>
           </a:p>
@@ -2366,7 +2392,7 @@
           <a:p>
             <a:fld id="{B9297548-97C3-46B5-B6F4-7C507BC4CE00}" type="datetimeFigureOut">
               <a:rPr lang="es-ES" smtClean="0"/>
-              <a:t>27/04/2017</a:t>
+              <a:t>28/04/2017</a:t>
             </a:fld>
             <a:endParaRPr lang="es-ES"/>
           </a:p>
@@ -2579,7 +2605,7 @@
           <a:p>
             <a:fld id="{B9297548-97C3-46B5-B6F4-7C507BC4CE00}" type="datetimeFigureOut">
               <a:rPr lang="es-ES" smtClean="0"/>
-              <a:t>27/04/2017</a:t>
+              <a:t>28/04/2017</a:t>
             </a:fld>
             <a:endParaRPr lang="es-ES"/>
           </a:p>

</xml_diff>